<commit_message>
Added homework to 07. Development-Tools
</commit_message>
<xml_diff>
--- a/07. Development-Tools/Development-Tools.pptx
+++ b/07. Development-Tools/Development-Tools.pptx
@@ -5,7 +5,7 @@
     <p:sldMasterId id="2147483660" r:id="rId1"/>
   </p:sldMasterIdLst>
   <p:notesMasterIdLst>
-    <p:notesMasterId r:id="rId32"/>
+    <p:notesMasterId r:id="rId30"/>
   </p:notesMasterIdLst>
   <p:sldIdLst>
     <p:sldId id="256" r:id="rId2"/>
@@ -36,8 +36,6 @@
     <p:sldId id="279" r:id="rId27"/>
     <p:sldId id="280" r:id="rId28"/>
     <p:sldId id="281" r:id="rId29"/>
-    <p:sldId id="293" r:id="rId30"/>
-    <p:sldId id="294" r:id="rId31"/>
   </p:sldIdLst>
   <p:sldSz cx="9144000" cy="6858000" type="screen4x3"/>
   <p:notesSz cx="6858000" cy="9144000"/>
@@ -237,7 +235,7 @@
           <a:p>
             <a:fld id="{D189D01A-8049-CD42-A449-03932FC0FD01}" type="datetimeFigureOut">
               <a:rPr lang="en-US" smtClean="0"/>
-              <a:t>06-Oct-14</a:t>
+              <a:t>1/3/2016</a:t>
             </a:fld>
             <a:endParaRPr lang="en-US"/>
           </a:p>
@@ -4956,7 +4954,7 @@
           <a:noFill/>
           <a:extLst>
             <a:ext uri="{909E8E84-426E-40dd-AFC4-6F175D3DCCD1}">
-              <a14:hiddenFill xmlns="" xmlns:a14="http://schemas.microsoft.com/office/drawing/2010/main">
+              <a14:hiddenFill xmlns:a14="http://schemas.microsoft.com/office/drawing/2010/main" xmlns="">
                 <a:solidFill>
                   <a:srgbClr val="FFFFFF"/>
                 </a:solidFill>
@@ -5001,14 +4999,14 @@
           <a:effectLst/>
           <a:extLst>
             <a:ext uri="{909E8E84-426E-40dd-AFC4-6F175D3DCCD1}">
-              <a14:hiddenFill xmlns="" xmlns:a14="http://schemas.microsoft.com/office/drawing/2010/main">
+              <a14:hiddenFill xmlns:a14="http://schemas.microsoft.com/office/drawing/2010/main" xmlns="">
                 <a:solidFill>
                   <a:schemeClr val="accent1"/>
                 </a:solidFill>
               </a14:hiddenFill>
             </a:ext>
             <a:ext uri="{91240B29-F687-4f45-9708-019B960494DF}">
-              <a14:hiddenLine xmlns="" xmlns:a14="http://schemas.microsoft.com/office/drawing/2010/main" w="9525">
+              <a14:hiddenLine xmlns:a14="http://schemas.microsoft.com/office/drawing/2010/main" xmlns="" w="9525">
                 <a:solidFill>
                   <a:schemeClr val="tx1"/>
                 </a:solidFill>
@@ -5018,7 +5016,7 @@
               </a14:hiddenLine>
             </a:ext>
             <a:ext uri="{AF507438-7753-43e0-B8FC-AC1667EBCBE1}">
-              <a14:hiddenEffects xmlns="" xmlns:a14="http://schemas.microsoft.com/office/drawing/2010/main">
+              <a14:hiddenEffects xmlns:a14="http://schemas.microsoft.com/office/drawing/2010/main" xmlns="">
                 <a:effectLst>
                   <a:outerShdw dist="35921" dir="2700000" algn="ctr" rotWithShape="0">
                     <a:schemeClr val="bg2"/>
@@ -5065,14 +5063,14 @@
           <a:effectLst/>
           <a:extLst>
             <a:ext uri="{909E8E84-426E-40dd-AFC4-6F175D3DCCD1}">
-              <a14:hiddenFill xmlns="" xmlns:a14="http://schemas.microsoft.com/office/drawing/2010/main">
+              <a14:hiddenFill xmlns:a14="http://schemas.microsoft.com/office/drawing/2010/main" xmlns="">
                 <a:solidFill>
                   <a:schemeClr val="accent1"/>
                 </a:solidFill>
               </a14:hiddenFill>
             </a:ext>
             <a:ext uri="{91240B29-F687-4f45-9708-019B960494DF}">
-              <a14:hiddenLine xmlns="" xmlns:a14="http://schemas.microsoft.com/office/drawing/2010/main" w="9525">
+              <a14:hiddenLine xmlns:a14="http://schemas.microsoft.com/office/drawing/2010/main" xmlns="" w="9525">
                 <a:solidFill>
                   <a:schemeClr val="tx1"/>
                 </a:solidFill>
@@ -5082,7 +5080,7 @@
               </a14:hiddenLine>
             </a:ext>
             <a:ext uri="{AF507438-7753-43e0-B8FC-AC1667EBCBE1}">
-              <a14:hiddenEffects xmlns="" xmlns:a14="http://schemas.microsoft.com/office/drawing/2010/main">
+              <a14:hiddenEffects xmlns:a14="http://schemas.microsoft.com/office/drawing/2010/main" xmlns="">
                 <a:effectLst>
                   <a:outerShdw dist="35921" dir="2700000" algn="ctr" rotWithShape="0">
                     <a:schemeClr val="bg2"/>
@@ -5142,7 +5140,7 @@
           </a:effectLst>
           <a:extLst>
             <a:ext uri="{909E8E84-426E-40dd-AFC4-6F175D3DCCD1}">
-              <a14:hiddenFill xmlns="" xmlns:a14="http://schemas.microsoft.com/office/drawing/2010/main">
+              <a14:hiddenFill xmlns:a14="http://schemas.microsoft.com/office/drawing/2010/main" xmlns="">
                 <a:solidFill>
                   <a:srgbClr val="FFFFFF"/>
                 </a:solidFill>
@@ -10710,11 +10708,7 @@
           <a:p>
             <a:r>
               <a:rPr lang="en-US" dirty="0" smtClean="0"/>
-              <a:t>Project </a:t>
-            </a:r>
-            <a:r>
-              <a:rPr lang="en-US" dirty="0" smtClean="0"/>
-              <a:t>tools</a:t>
+              <a:t>Project tools</a:t>
             </a:r>
           </a:p>
           <a:p>
@@ -13763,406 +13757,6 @@
 </p:sld>
 </file>
 
-<file path=ppt/slides/slide29.xml><?xml version="1.0" encoding="utf-8"?>
-<p:sld xmlns:a="http://schemas.openxmlformats.org/drawingml/2006/main" xmlns:r="http://schemas.openxmlformats.org/officeDocument/2006/relationships" xmlns:p="http://schemas.openxmlformats.org/presentationml/2006/main">
-  <p:cSld>
-    <p:spTree>
-      <p:nvGrpSpPr>
-        <p:cNvPr id="1" name=""/>
-        <p:cNvGrpSpPr/>
-        <p:nvPr/>
-      </p:nvGrpSpPr>
-      <p:grpSpPr>
-        <a:xfrm>
-          <a:off x="0" y="0"/>
-          <a:ext cx="0" cy="0"/>
-          <a:chOff x="0" y="0"/>
-          <a:chExt cx="0" cy="0"/>
-        </a:xfrm>
-      </p:grpSpPr>
-      <p:sp>
-        <p:nvSpPr>
-          <p:cNvPr id="4" name="Title 3"/>
-          <p:cNvSpPr>
-            <a:spLocks noGrp="1"/>
-          </p:cNvSpPr>
-          <p:nvPr>
-            <p:ph type="title"/>
-          </p:nvPr>
-        </p:nvSpPr>
-        <p:spPr/>
-        <p:txBody>
-          <a:bodyPr/>
-          <a:lstStyle/>
-          <a:p>
-            <a:r>
-              <a:rPr lang="en-US" dirty="0" smtClean="0"/>
-              <a:t>Homework</a:t>
-            </a:r>
-            <a:endParaRPr lang="en-US" dirty="0"/>
-          </a:p>
-        </p:txBody>
-      </p:sp>
-      <p:sp>
-        <p:nvSpPr>
-          <p:cNvPr id="5" name="Content Placeholder 4"/>
-          <p:cNvSpPr>
-            <a:spLocks noGrp="1"/>
-          </p:cNvSpPr>
-          <p:nvPr>
-            <p:ph idx="1"/>
-          </p:nvPr>
-        </p:nvSpPr>
-        <p:spPr>
-          <a:xfrm>
-            <a:off x="228600" y="825620"/>
-            <a:ext cx="8686800" cy="6032379"/>
-          </a:xfrm>
-        </p:spPr>
-        <p:txBody>
-          <a:bodyPr/>
-          <a:lstStyle/>
-          <a:p>
-            <a:pPr marL="346075" indent="-346075">
-              <a:lnSpc>
-                <a:spcPct val="90000"/>
-              </a:lnSpc>
-              <a:buFont typeface="+mj-lt"/>
-              <a:buAutoNum type="arabicPeriod"/>
-            </a:pPr>
-            <a:r>
-              <a:rPr lang="en-US" sz="3000" dirty="0" smtClean="0"/>
-              <a:t>Create a project with a Gruntfile.js and three folders – </a:t>
-            </a:r>
-            <a:r>
-              <a:rPr lang="en-US" sz="3000" dirty="0" smtClean="0">
-                <a:solidFill>
-                  <a:schemeClr val="accent5">
-                    <a:lumMod val="20000"/>
-                    <a:lumOff val="80000"/>
-                  </a:schemeClr>
-                </a:solidFill>
-              </a:rPr>
-              <a:t>DEV </a:t>
-            </a:r>
-            <a:r>
-              <a:rPr lang="en-US" sz="3000" dirty="0" smtClean="0"/>
-              <a:t>folder, </a:t>
-            </a:r>
-            <a:r>
-              <a:rPr lang="en-US" sz="3000" dirty="0" smtClean="0">
-                <a:solidFill>
-                  <a:schemeClr val="accent5">
-                    <a:lumMod val="20000"/>
-                    <a:lumOff val="80000"/>
-                  </a:schemeClr>
-                </a:solidFill>
-              </a:rPr>
-              <a:t>APP </a:t>
-            </a:r>
-            <a:r>
-              <a:rPr lang="en-US" sz="3000" dirty="0" smtClean="0"/>
-              <a:t>folder and </a:t>
-            </a:r>
-            <a:r>
-              <a:rPr lang="en-US" sz="3000" dirty="0" smtClean="0">
-                <a:solidFill>
-                  <a:schemeClr val="accent5">
-                    <a:lumMod val="20000"/>
-                    <a:lumOff val="80000"/>
-                  </a:schemeClr>
-                </a:solidFill>
-              </a:rPr>
-              <a:t>DIST </a:t>
-            </a:r>
-            <a:r>
-              <a:rPr lang="en-US" sz="3000" dirty="0" smtClean="0"/>
-              <a:t>folder</a:t>
-            </a:r>
-          </a:p>
-          <a:p>
-            <a:pPr marL="684213" lvl="1" indent="-336550">
-              <a:lnSpc>
-                <a:spcPct val="90000"/>
-              </a:lnSpc>
-            </a:pPr>
-            <a:r>
-              <a:rPr lang="en-US" sz="2600" dirty="0" smtClean="0"/>
-              <a:t>Write some CoffeeScript, Jade and Stylus in </a:t>
-            </a:r>
-            <a:r>
-              <a:rPr lang="en-US" sz="2600" dirty="0" smtClean="0">
-                <a:solidFill>
-                  <a:schemeClr val="accent5">
-                    <a:lumMod val="20000"/>
-                    <a:lumOff val="80000"/>
-                  </a:schemeClr>
-                </a:solidFill>
-              </a:rPr>
-              <a:t>APP</a:t>
-            </a:r>
-            <a:endParaRPr lang="en-US" sz="2600" dirty="0" smtClean="0"/>
-          </a:p>
-          <a:p>
-            <a:pPr marL="684213" lvl="1" indent="-336550">
-              <a:lnSpc>
-                <a:spcPct val="90000"/>
-              </a:lnSpc>
-            </a:pPr>
-            <a:r>
-              <a:rPr lang="en-US" sz="2600" dirty="0" smtClean="0"/>
-              <a:t>Register the following grunt tasks:</a:t>
-            </a:r>
-          </a:p>
-          <a:p>
-            <a:pPr marL="746125" lvl="2" indent="-231775">
-              <a:lnSpc>
-                <a:spcPct val="90000"/>
-              </a:lnSpc>
-            </a:pPr>
-            <a:r>
-              <a:rPr lang="en-US" sz="2400" dirty="0" smtClean="0"/>
-              <a:t>Serve:</a:t>
-            </a:r>
-          </a:p>
-          <a:p>
-            <a:pPr marL="860425" lvl="3" indent="-230188">
-              <a:lnSpc>
-                <a:spcPct val="90000"/>
-              </a:lnSpc>
-            </a:pPr>
-            <a:r>
-              <a:rPr lang="en-US" sz="2200" dirty="0" smtClean="0">
-                <a:solidFill>
-                  <a:schemeClr val="accent5">
-                    <a:lumMod val="20000"/>
-                    <a:lumOff val="80000"/>
-                  </a:schemeClr>
-                </a:solidFill>
-              </a:rPr>
-              <a:t>Compiles the CoffeeScript</a:t>
-            </a:r>
-            <a:r>
-              <a:rPr lang="en-US" sz="2200" dirty="0" smtClean="0"/>
-              <a:t> to JS and puts them into </a:t>
-            </a:r>
-            <a:r>
-              <a:rPr lang="en-US" sz="2200" dirty="0" smtClean="0">
-                <a:solidFill>
-                  <a:schemeClr val="accent5">
-                    <a:lumMod val="20000"/>
-                    <a:lumOff val="80000"/>
-                  </a:schemeClr>
-                </a:solidFill>
-              </a:rPr>
-              <a:t>DEV/scripts</a:t>
-            </a:r>
-          </a:p>
-          <a:p>
-            <a:pPr marL="860425" lvl="3" indent="-230188">
-              <a:lnSpc>
-                <a:spcPct val="90000"/>
-              </a:lnSpc>
-            </a:pPr>
-            <a:r>
-              <a:rPr lang="en-US" sz="2200" dirty="0"/>
-              <a:t>Runs </a:t>
-            </a:r>
-            <a:r>
-              <a:rPr lang="en-US" sz="2200" dirty="0" err="1" smtClean="0">
-                <a:solidFill>
-                  <a:schemeClr val="accent5">
-                    <a:lumMod val="20000"/>
-                    <a:lumOff val="80000"/>
-                  </a:schemeClr>
-                </a:solidFill>
-              </a:rPr>
-              <a:t>jshint</a:t>
-            </a:r>
-            <a:r>
-              <a:rPr lang="en-US" sz="2200" dirty="0" smtClean="0">
-                <a:solidFill>
-                  <a:schemeClr val="accent5">
-                    <a:lumMod val="20000"/>
-                    <a:lumOff val="80000"/>
-                  </a:schemeClr>
-                </a:solidFill>
-              </a:rPr>
-              <a:t> </a:t>
-            </a:r>
-            <a:r>
-              <a:rPr lang="en-US" sz="2200" dirty="0" smtClean="0"/>
-              <a:t>on the compiled JS files</a:t>
-            </a:r>
-            <a:endParaRPr lang="bg-BG" sz="2200" dirty="0"/>
-          </a:p>
-          <a:p>
-            <a:pPr marL="860425" lvl="3" indent="-230188">
-              <a:lnSpc>
-                <a:spcPct val="90000"/>
-              </a:lnSpc>
-            </a:pPr>
-            <a:r>
-              <a:rPr lang="en-US" sz="2200" dirty="0">
-                <a:solidFill>
-                  <a:schemeClr val="accent5">
-                    <a:lumMod val="20000"/>
-                    <a:lumOff val="80000"/>
-                  </a:schemeClr>
-                </a:solidFill>
-              </a:rPr>
-              <a:t>Compiles the Jade</a:t>
-            </a:r>
-            <a:r>
-              <a:rPr lang="en-US" sz="2200" dirty="0"/>
-              <a:t> to HTML and puts them into </a:t>
-            </a:r>
-            <a:r>
-              <a:rPr lang="en-US" sz="2200" dirty="0" smtClean="0">
-                <a:solidFill>
-                  <a:schemeClr val="accent5">
-                    <a:lumMod val="20000"/>
-                    <a:lumOff val="80000"/>
-                  </a:schemeClr>
-                </a:solidFill>
-              </a:rPr>
-              <a:t>DEV</a:t>
-            </a:r>
-          </a:p>
-          <a:p>
-            <a:pPr marL="860425" lvl="3" indent="-230188">
-              <a:lnSpc>
-                <a:spcPct val="90000"/>
-              </a:lnSpc>
-            </a:pPr>
-            <a:r>
-              <a:rPr lang="en-US" sz="2200" dirty="0">
-                <a:solidFill>
-                  <a:schemeClr val="accent5">
-                    <a:lumMod val="20000"/>
-                    <a:lumOff val="80000"/>
-                  </a:schemeClr>
-                </a:solidFill>
-              </a:rPr>
-              <a:t>Compiles the Stylus</a:t>
-            </a:r>
-            <a:r>
-              <a:rPr lang="en-US" sz="2200" dirty="0"/>
-              <a:t> to CSS and puts them into DEV/styles</a:t>
-            </a:r>
-            <a:endParaRPr lang="bg-BG" sz="2200" dirty="0"/>
-          </a:p>
-          <a:p>
-            <a:pPr marL="860425" lvl="3" indent="-230188">
-              <a:lnSpc>
-                <a:spcPct val="90000"/>
-              </a:lnSpc>
-            </a:pPr>
-            <a:r>
-              <a:rPr lang="en-US" sz="2200" dirty="0">
-                <a:solidFill>
-                  <a:schemeClr val="accent5">
-                    <a:lumMod val="20000"/>
-                    <a:lumOff val="80000"/>
-                  </a:schemeClr>
-                </a:solidFill>
-              </a:rPr>
-              <a:t>Copies</a:t>
-            </a:r>
-            <a:r>
-              <a:rPr lang="en-US" sz="2200" dirty="0"/>
-              <a:t> every image from the </a:t>
-            </a:r>
-            <a:r>
-              <a:rPr lang="en-US" sz="2200" dirty="0">
-                <a:solidFill>
-                  <a:schemeClr val="accent5">
-                    <a:lumMod val="20000"/>
-                    <a:lumOff val="80000"/>
-                  </a:schemeClr>
-                </a:solidFill>
-              </a:rPr>
-              <a:t>APP/images</a:t>
-            </a:r>
-            <a:r>
-              <a:rPr lang="en-US" sz="2200" dirty="0"/>
-              <a:t> to </a:t>
-            </a:r>
-            <a:r>
-              <a:rPr lang="en-US" sz="2200" dirty="0">
-                <a:solidFill>
-                  <a:schemeClr val="accent5">
-                    <a:lumMod val="20000"/>
-                    <a:lumOff val="80000"/>
-                  </a:schemeClr>
-                </a:solidFill>
-              </a:rPr>
-              <a:t>DEV/images</a:t>
-            </a:r>
-          </a:p>
-          <a:p>
-            <a:pPr marL="860425" lvl="3" indent="-230188">
-              <a:lnSpc>
-                <a:spcPct val="90000"/>
-              </a:lnSpc>
-            </a:pPr>
-            <a:r>
-              <a:rPr lang="en-US" sz="2200" dirty="0"/>
-              <a:t>Connect a </a:t>
-            </a:r>
-            <a:r>
-              <a:rPr lang="en-US" sz="2200" dirty="0" smtClean="0"/>
-              <a:t>server on port 9578 and show the contents of </a:t>
-            </a:r>
-            <a:r>
-              <a:rPr lang="en-US" sz="2200" dirty="0">
-                <a:solidFill>
-                  <a:schemeClr val="accent5">
-                    <a:lumMod val="20000"/>
-                    <a:lumOff val="80000"/>
-                  </a:schemeClr>
-                </a:solidFill>
-              </a:rPr>
-              <a:t>DEV</a:t>
-            </a:r>
-          </a:p>
-          <a:p>
-            <a:pPr marL="860425" lvl="3" indent="-230188">
-              <a:lnSpc>
-                <a:spcPct val="90000"/>
-              </a:lnSpc>
-            </a:pPr>
-            <a:r>
-              <a:rPr lang="en-US" sz="2200" dirty="0">
-                <a:solidFill>
-                  <a:schemeClr val="accent5">
-                    <a:lumMod val="20000"/>
-                    <a:lumOff val="80000"/>
-                  </a:schemeClr>
-                </a:solidFill>
-              </a:rPr>
-              <a:t>Watch for changes</a:t>
-            </a:r>
-            <a:r>
-              <a:rPr lang="en-US" sz="2200" dirty="0"/>
-              <a:t> to the CoffeeScript, Stylus and Jade files, and if changed – reload the page into the browser</a:t>
-            </a:r>
-          </a:p>
-        </p:txBody>
-      </p:sp>
-    </p:spTree>
-    <p:extLst>
-      <p:ext uri="{BB962C8B-B14F-4D97-AF65-F5344CB8AC3E}">
-        <p14:creationId xmlns:p14="http://schemas.microsoft.com/office/powerpoint/2010/main" val="2023157547"/>
-      </p:ext>
-    </p:extLst>
-  </p:cSld>
-  <p:clrMapOvr>
-    <a:masterClrMapping/>
-  </p:clrMapOvr>
-</p:sld>
-</file>
-
 <file path=ppt/slides/slide3.xml><?xml version="1.0" encoding="utf-8"?>
 <p:sld xmlns:a="http://schemas.openxmlformats.org/drawingml/2006/main" xmlns:r="http://schemas.openxmlformats.org/officeDocument/2006/relationships" xmlns:p="http://schemas.openxmlformats.org/presentationml/2006/main">
   <p:cSld>
@@ -14243,457 +13837,6 @@
       </p:par>
     </p:tnLst>
   </p:timing>
-</p:sld>
-</file>
-
-<file path=ppt/slides/slide30.xml><?xml version="1.0" encoding="utf-8"?>
-<p:sld xmlns:a="http://schemas.openxmlformats.org/drawingml/2006/main" xmlns:r="http://schemas.openxmlformats.org/officeDocument/2006/relationships" xmlns:p="http://schemas.openxmlformats.org/presentationml/2006/main">
-  <p:cSld>
-    <p:spTree>
-      <p:nvGrpSpPr>
-        <p:cNvPr id="1" name=""/>
-        <p:cNvGrpSpPr/>
-        <p:nvPr/>
-      </p:nvGrpSpPr>
-      <p:grpSpPr>
-        <a:xfrm>
-          <a:off x="0" y="0"/>
-          <a:ext cx="0" cy="0"/>
-          <a:chOff x="0" y="0"/>
-          <a:chExt cx="0" cy="0"/>
-        </a:xfrm>
-      </p:grpSpPr>
-      <p:sp>
-        <p:nvSpPr>
-          <p:cNvPr id="4" name="Title 3"/>
-          <p:cNvSpPr>
-            <a:spLocks noGrp="1"/>
-          </p:cNvSpPr>
-          <p:nvPr>
-            <p:ph type="title"/>
-          </p:nvPr>
-        </p:nvSpPr>
-        <p:spPr/>
-        <p:txBody>
-          <a:bodyPr/>
-          <a:lstStyle/>
-          <a:p>
-            <a:r>
-              <a:rPr lang="en-US" smtClean="0"/>
-              <a:t>Homework (2)</a:t>
-            </a:r>
-            <a:endParaRPr lang="en-US" dirty="0"/>
-          </a:p>
-        </p:txBody>
-      </p:sp>
-      <p:sp>
-        <p:nvSpPr>
-          <p:cNvPr id="5" name="Content Placeholder 4"/>
-          <p:cNvSpPr>
-            <a:spLocks noGrp="1"/>
-          </p:cNvSpPr>
-          <p:nvPr>
-            <p:ph idx="1"/>
-          </p:nvPr>
-        </p:nvSpPr>
-        <p:spPr>
-          <a:xfrm>
-            <a:off x="228600" y="825621"/>
-            <a:ext cx="8686800" cy="5791200"/>
-          </a:xfrm>
-        </p:spPr>
-        <p:txBody>
-          <a:bodyPr/>
-          <a:lstStyle/>
-          <a:p>
-            <a:pPr marL="346075" indent="-346075">
-              <a:lnSpc>
-                <a:spcPct val="90000"/>
-              </a:lnSpc>
-              <a:buFont typeface="+mj-lt"/>
-              <a:buAutoNum type="arabicPeriod"/>
-            </a:pPr>
-            <a:r>
-              <a:rPr lang="en-US" sz="3000" dirty="0" smtClean="0"/>
-              <a:t>*cont. Create a project with a Gruntfile.js and three folders – </a:t>
-            </a:r>
-            <a:r>
-              <a:rPr lang="en-US" sz="3000" dirty="0" smtClean="0">
-                <a:solidFill>
-                  <a:schemeClr val="accent5">
-                    <a:lumMod val="20000"/>
-                    <a:lumOff val="80000"/>
-                  </a:schemeClr>
-                </a:solidFill>
-              </a:rPr>
-              <a:t>DEV </a:t>
-            </a:r>
-            <a:r>
-              <a:rPr lang="en-US" sz="3000" dirty="0" smtClean="0"/>
-              <a:t>folder, </a:t>
-            </a:r>
-            <a:r>
-              <a:rPr lang="en-US" sz="3000" dirty="0" smtClean="0">
-                <a:solidFill>
-                  <a:schemeClr val="accent5">
-                    <a:lumMod val="20000"/>
-                    <a:lumOff val="80000"/>
-                  </a:schemeClr>
-                </a:solidFill>
-              </a:rPr>
-              <a:t>APP </a:t>
-            </a:r>
-            <a:r>
-              <a:rPr lang="en-US" sz="3000" dirty="0" smtClean="0"/>
-              <a:t>folder and </a:t>
-            </a:r>
-            <a:r>
-              <a:rPr lang="en-US" sz="3000" dirty="0" smtClean="0">
-                <a:solidFill>
-                  <a:schemeClr val="accent5">
-                    <a:lumMod val="20000"/>
-                    <a:lumOff val="80000"/>
-                  </a:schemeClr>
-                </a:solidFill>
-              </a:rPr>
-              <a:t>DIST </a:t>
-            </a:r>
-            <a:r>
-              <a:rPr lang="en-US" sz="3000" dirty="0" smtClean="0"/>
-              <a:t>folder</a:t>
-            </a:r>
-          </a:p>
-          <a:p>
-            <a:pPr marL="684213" lvl="1" indent="-336550">
-              <a:lnSpc>
-                <a:spcPct val="90000"/>
-              </a:lnSpc>
-            </a:pPr>
-            <a:r>
-              <a:rPr lang="en-US" sz="2600" dirty="0" smtClean="0"/>
-              <a:t>Write some CoffeeScript, Jade and Stylus in </a:t>
-            </a:r>
-            <a:r>
-              <a:rPr lang="en-US" sz="2600" dirty="0" smtClean="0">
-                <a:solidFill>
-                  <a:schemeClr val="accent5">
-                    <a:lumMod val="20000"/>
-                    <a:lumOff val="80000"/>
-                  </a:schemeClr>
-                </a:solidFill>
-              </a:rPr>
-              <a:t>APP</a:t>
-            </a:r>
-            <a:endParaRPr lang="en-US" sz="2600" dirty="0" smtClean="0"/>
-          </a:p>
-          <a:p>
-            <a:pPr marL="684213" lvl="1" indent="-336550">
-              <a:lnSpc>
-                <a:spcPct val="90000"/>
-              </a:lnSpc>
-            </a:pPr>
-            <a:r>
-              <a:rPr lang="en-US" sz="2600" dirty="0" smtClean="0"/>
-              <a:t>Register the following grunt tasks:</a:t>
-            </a:r>
-          </a:p>
-          <a:p>
-            <a:pPr marL="746125" lvl="2" indent="-231775">
-              <a:lnSpc>
-                <a:spcPct val="90000"/>
-              </a:lnSpc>
-            </a:pPr>
-            <a:r>
-              <a:rPr lang="en-US" sz="2400" dirty="0" smtClean="0"/>
-              <a:t>Build:</a:t>
-            </a:r>
-          </a:p>
-          <a:p>
-            <a:pPr marL="1011237" lvl="3" indent="-231775">
-              <a:lnSpc>
-                <a:spcPct val="90000"/>
-              </a:lnSpc>
-            </a:pPr>
-            <a:r>
-              <a:rPr lang="en-US" sz="2200" dirty="0" smtClean="0"/>
-              <a:t>Compiles CoffeeScript, Stylus and Jade</a:t>
-            </a:r>
-          </a:p>
-          <a:p>
-            <a:pPr marL="1011237" lvl="3" indent="-231775">
-              <a:lnSpc>
-                <a:spcPct val="90000"/>
-              </a:lnSpc>
-            </a:pPr>
-            <a:r>
-              <a:rPr lang="en-US" sz="2200" dirty="0" smtClean="0"/>
-              <a:t>Runs </a:t>
-            </a:r>
-            <a:r>
-              <a:rPr lang="en-US" sz="2200" dirty="0" err="1" smtClean="0">
-                <a:solidFill>
-                  <a:schemeClr val="accent5">
-                    <a:lumMod val="20000"/>
-                    <a:lumOff val="80000"/>
-                  </a:schemeClr>
-                </a:solidFill>
-              </a:rPr>
-              <a:t>jshint</a:t>
-            </a:r>
-            <a:r>
-              <a:rPr lang="en-US" sz="2200" dirty="0" smtClean="0">
-                <a:solidFill>
-                  <a:schemeClr val="accent5">
-                    <a:lumMod val="20000"/>
-                    <a:lumOff val="80000"/>
-                  </a:schemeClr>
-                </a:solidFill>
-              </a:rPr>
-              <a:t> </a:t>
-            </a:r>
-            <a:r>
-              <a:rPr lang="en-US" sz="2200" dirty="0" smtClean="0"/>
-              <a:t>and </a:t>
-            </a:r>
-            <a:r>
-              <a:rPr lang="en-US" sz="2200" dirty="0" err="1" smtClean="0">
-                <a:solidFill>
-                  <a:schemeClr val="accent5">
-                    <a:lumMod val="20000"/>
-                    <a:lumOff val="80000"/>
-                  </a:schemeClr>
-                </a:solidFill>
-              </a:rPr>
-              <a:t>csslint</a:t>
-            </a:r>
-            <a:endParaRPr lang="en-US" sz="2200" dirty="0" smtClean="0">
-              <a:solidFill>
-                <a:schemeClr val="accent5">
-                  <a:lumMod val="20000"/>
-                  <a:lumOff val="80000"/>
-                </a:schemeClr>
-              </a:solidFill>
-            </a:endParaRPr>
-          </a:p>
-          <a:p>
-            <a:pPr marL="1011237" lvl="3" indent="-231775">
-              <a:lnSpc>
-                <a:spcPct val="90000"/>
-              </a:lnSpc>
-            </a:pPr>
-            <a:r>
-              <a:rPr lang="en-US" sz="2200" dirty="0" err="1" smtClean="0">
-                <a:solidFill>
-                  <a:schemeClr val="accent5">
-                    <a:lumMod val="20000"/>
-                    <a:lumOff val="80000"/>
-                  </a:schemeClr>
-                </a:solidFill>
-              </a:rPr>
-              <a:t>Concats</a:t>
-            </a:r>
-            <a:r>
-              <a:rPr lang="en-US" sz="2200" dirty="0" smtClean="0"/>
-              <a:t> all CSS files into one file and </a:t>
-            </a:r>
-            <a:r>
-              <a:rPr lang="en-US" sz="2200" dirty="0" smtClean="0">
-                <a:solidFill>
-                  <a:schemeClr val="accent5">
-                    <a:lumMod val="20000"/>
-                    <a:lumOff val="80000"/>
-                  </a:schemeClr>
-                </a:solidFill>
-              </a:rPr>
-              <a:t>minify</a:t>
-            </a:r>
-            <a:r>
-              <a:rPr lang="en-US" sz="2200" dirty="0" smtClean="0"/>
-              <a:t> it into </a:t>
-            </a:r>
-            <a:r>
-              <a:rPr lang="en-US" sz="2200" dirty="0" smtClean="0">
-                <a:solidFill>
-                  <a:schemeClr val="accent5">
-                    <a:lumMod val="20000"/>
-                    <a:lumOff val="80000"/>
-                  </a:schemeClr>
-                </a:solidFill>
-              </a:rPr>
-              <a:t>DIST/styles</a:t>
-            </a:r>
-          </a:p>
-          <a:p>
-            <a:pPr marL="1011237" lvl="3" indent="-231775">
-              <a:lnSpc>
-                <a:spcPct val="90000"/>
-              </a:lnSpc>
-            </a:pPr>
-            <a:r>
-              <a:rPr lang="en-US" sz="2200" dirty="0" err="1" smtClean="0">
-                <a:solidFill>
-                  <a:schemeClr val="accent5">
-                    <a:lumMod val="20000"/>
-                    <a:lumOff val="80000"/>
-                  </a:schemeClr>
-                </a:solidFill>
-              </a:rPr>
-              <a:t>Concats</a:t>
-            </a:r>
-            <a:r>
-              <a:rPr lang="en-US" sz="2200" dirty="0" smtClean="0">
-                <a:solidFill>
-                  <a:schemeClr val="accent5">
-                    <a:lumMod val="20000"/>
-                    <a:lumOff val="80000"/>
-                  </a:schemeClr>
-                </a:solidFill>
-              </a:rPr>
-              <a:t> </a:t>
-            </a:r>
-            <a:r>
-              <a:rPr lang="en-US" sz="2200" dirty="0"/>
-              <a:t>all </a:t>
-            </a:r>
-            <a:r>
-              <a:rPr lang="en-US" sz="2200" dirty="0" smtClean="0"/>
-              <a:t>JS files </a:t>
-            </a:r>
-            <a:r>
-              <a:rPr lang="en-US" sz="2200" dirty="0"/>
-              <a:t>into one file and </a:t>
-            </a:r>
-            <a:r>
-              <a:rPr lang="en-US" sz="2200" dirty="0" err="1" smtClean="0">
-                <a:solidFill>
-                  <a:schemeClr val="accent5">
-                    <a:lumMod val="20000"/>
-                    <a:lumOff val="80000"/>
-                  </a:schemeClr>
-                </a:solidFill>
-              </a:rPr>
-              <a:t>uglify</a:t>
-            </a:r>
-            <a:r>
-              <a:rPr lang="en-US" sz="2200" dirty="0" smtClean="0">
-                <a:solidFill>
-                  <a:schemeClr val="accent5">
-                    <a:lumMod val="20000"/>
-                    <a:lumOff val="80000"/>
-                  </a:schemeClr>
-                </a:solidFill>
-              </a:rPr>
-              <a:t> </a:t>
-            </a:r>
-            <a:r>
-              <a:rPr lang="en-US" sz="2200" dirty="0" smtClean="0"/>
-              <a:t>it </a:t>
-            </a:r>
-            <a:r>
-              <a:rPr lang="en-US" sz="2200" dirty="0"/>
-              <a:t>into </a:t>
-            </a:r>
-            <a:r>
-              <a:rPr lang="en-US" sz="2200" dirty="0" smtClean="0">
-                <a:solidFill>
-                  <a:schemeClr val="accent5">
-                    <a:lumMod val="20000"/>
-                    <a:lumOff val="80000"/>
-                  </a:schemeClr>
-                </a:solidFill>
-              </a:rPr>
-              <a:t>DIST/scripts</a:t>
-            </a:r>
-          </a:p>
-          <a:p>
-            <a:pPr marL="1011237" lvl="3" indent="-231775">
-              <a:lnSpc>
-                <a:spcPct val="90000"/>
-              </a:lnSpc>
-            </a:pPr>
-            <a:r>
-              <a:rPr lang="en-US" sz="2200" dirty="0" err="1" smtClean="0">
-                <a:solidFill>
-                  <a:schemeClr val="accent5">
-                    <a:lumMod val="20000"/>
-                    <a:lumOff val="80000"/>
-                  </a:schemeClr>
-                </a:solidFill>
-              </a:rPr>
-              <a:t>Uglifies</a:t>
-            </a:r>
-            <a:r>
-              <a:rPr lang="en-US" sz="2200" dirty="0" smtClean="0">
-                <a:solidFill>
-                  <a:schemeClr val="accent5">
-                    <a:lumMod val="20000"/>
-                    <a:lumOff val="80000"/>
-                  </a:schemeClr>
-                </a:solidFill>
-              </a:rPr>
-              <a:t> </a:t>
-            </a:r>
-            <a:r>
-              <a:rPr lang="en-US" sz="2200" dirty="0" smtClean="0"/>
-              <a:t>the HTML files into </a:t>
-            </a:r>
-            <a:r>
-              <a:rPr lang="en-US" sz="2200" dirty="0" smtClean="0">
-                <a:solidFill>
-                  <a:schemeClr val="accent5">
-                    <a:lumMod val="20000"/>
-                    <a:lumOff val="80000"/>
-                  </a:schemeClr>
-                </a:solidFill>
-              </a:rPr>
-              <a:t>DIST</a:t>
-            </a:r>
-          </a:p>
-          <a:p>
-            <a:pPr marL="1011237" lvl="3" indent="-231775">
-              <a:lnSpc>
-                <a:spcPct val="90000"/>
-              </a:lnSpc>
-            </a:pPr>
-            <a:r>
-              <a:rPr lang="en-US" sz="2200" dirty="0" smtClean="0">
-                <a:solidFill>
-                  <a:schemeClr val="accent5">
-                    <a:lumMod val="20000"/>
-                    <a:lumOff val="80000"/>
-                  </a:schemeClr>
-                </a:solidFill>
-              </a:rPr>
-              <a:t>Copies</a:t>
-            </a:r>
-            <a:r>
-              <a:rPr lang="en-US" sz="2200" dirty="0" smtClean="0"/>
-              <a:t> all images into </a:t>
-            </a:r>
-            <a:r>
-              <a:rPr lang="en-US" sz="2200" dirty="0" smtClean="0">
-                <a:solidFill>
-                  <a:schemeClr val="accent5">
-                    <a:lumMod val="20000"/>
-                    <a:lumOff val="80000"/>
-                  </a:schemeClr>
-                </a:solidFill>
-              </a:rPr>
-              <a:t>DIST/images</a:t>
-            </a:r>
-          </a:p>
-        </p:txBody>
-      </p:sp>
-    </p:spTree>
-    <p:extLst>
-      <p:ext uri="{BB962C8B-B14F-4D97-AF65-F5344CB8AC3E}">
-        <p14:creationId xmlns:p14="http://schemas.microsoft.com/office/powerpoint/2010/main" val="4254864182"/>
-      </p:ext>
-    </p:extLst>
-  </p:cSld>
-  <p:clrMapOvr>
-    <a:masterClrMapping/>
-  </p:clrMapOvr>
 </p:sld>
 </file>
 

</xml_diff>